<commit_message>
removed publish artifact stage
</commit_message>
<xml_diff>
--- a/YouDontKnowJaC-Gluecon2018.pptx
+++ b/YouDontKnowJaC-Gluecon2018.pptx
@@ -3106,7 +3106,7 @@
               <a:defRPr sz="6660"/>
             </a:pPr>
             <a:r>
-              <a:t>pipelines through code</a:t>
+              <a:t>pipelines as code</a:t>
             </a:r>
           </a:p>
         </p:txBody>
@@ -3289,7 +3289,7 @@
       </p:grpSpPr>
       <p:sp>
         <p:nvSpPr>
-          <p:cNvPr id="175" name="Why do this?"/>
+          <p:cNvPr id="166" name="Why do this?"/>
           <p:cNvSpPr txBox="1"/>
           <p:nvPr>
             <p:ph type="title"/>
@@ -3317,7 +3317,7 @@
       </p:sp>
       <p:sp>
         <p:nvSpPr>
-          <p:cNvPr id="176" name="Changes can be versioned in source control, tested and peer reviewed…"/>
+          <p:cNvPr id="167" name="Changes can be versioned in source control, tested and peer reviewed…"/>
           <p:cNvSpPr txBox="1"/>
           <p:nvPr/>
         </p:nvSpPr>
@@ -3479,7 +3479,7 @@
       </p:sp>
       <p:sp>
         <p:nvSpPr>
-          <p:cNvPr id="177" name="@bpmericle"/>
+          <p:cNvPr id="168" name="@bpmericle"/>
           <p:cNvSpPr txBox="1"/>
           <p:nvPr/>
         </p:nvSpPr>
@@ -3519,7 +3519,7 @@
       </p:sp>
       <p:pic>
         <p:nvPicPr>
-          <p:cNvPr id="178" name="Logo2018_72DPI.png" descr="Logo2018_72DPI.png"/>
+          <p:cNvPr id="169" name="Logo2018_72DPI.png" descr="Logo2018_72DPI.png"/>
           <p:cNvPicPr>
             <a:picLocks noChangeAspect="1"/>
           </p:cNvPicPr>
@@ -3574,7 +3574,7 @@
       </p:grpSpPr>
       <p:sp>
         <p:nvSpPr>
-          <p:cNvPr id="180" name="Why to not do this?"/>
+          <p:cNvPr id="171" name="Why not do this?"/>
           <p:cNvSpPr txBox="1"/>
           <p:nvPr>
             <p:ph type="title"/>
@@ -3595,21 +3595,21 @@
           <a:p>
             <a:pPr/>
             <a:r>
-              <a:t>Why to not do this?</a:t>
-            </a:r>
-          </a:p>
-        </p:txBody>
-      </p:sp>
-      <p:sp>
-        <p:nvSpPr>
-          <p:cNvPr id="181" name="DSL learning curve…"/>
+              <a:t>Why not do this?</a:t>
+            </a:r>
+          </a:p>
+        </p:txBody>
+      </p:sp>
+      <p:sp>
+        <p:nvSpPr>
+          <p:cNvPr id="172" name="DSL learning curve…"/>
           <p:cNvSpPr txBox="1"/>
           <p:nvPr/>
         </p:nvSpPr>
         <p:spPr>
           <a:xfrm>
-            <a:off x="2958128" y="4846792"/>
-            <a:ext cx="18467745" cy="4673601"/>
+            <a:off x="2958127" y="4846792"/>
+            <a:ext cx="18467746" cy="4673601"/>
           </a:xfrm>
           <a:prstGeom prst="rect">
             <a:avLst/>
@@ -3700,7 +3700,7 @@
       </p:sp>
       <p:sp>
         <p:nvSpPr>
-          <p:cNvPr id="182" name="@bpmericle"/>
+          <p:cNvPr id="173" name="@bpmericle"/>
           <p:cNvSpPr txBox="1"/>
           <p:nvPr/>
         </p:nvSpPr>
@@ -3740,7 +3740,7 @@
       </p:sp>
       <p:pic>
         <p:nvPicPr>
-          <p:cNvPr id="183" name="Logo2018_72DPI.png" descr="Logo2018_72DPI.png"/>
+          <p:cNvPr id="174" name="Logo2018_72DPI.png" descr="Logo2018_72DPI.png"/>
           <p:cNvPicPr>
             <a:picLocks noChangeAspect="1"/>
           </p:cNvPicPr>
@@ -3795,7 +3795,7 @@
       </p:grpSpPr>
       <p:sp>
         <p:nvSpPr>
-          <p:cNvPr id="185" name="Demo"/>
+          <p:cNvPr id="176" name="Demo"/>
           <p:cNvSpPr txBox="1"/>
           <p:nvPr/>
         </p:nvSpPr>
@@ -3835,7 +3835,7 @@
       </p:sp>
       <p:sp>
         <p:nvSpPr>
-          <p:cNvPr id="186" name="@bpmericle"/>
+          <p:cNvPr id="177" name="@bpmericle"/>
           <p:cNvSpPr txBox="1"/>
           <p:nvPr/>
         </p:nvSpPr>
@@ -3875,7 +3875,7 @@
       </p:sp>
       <p:pic>
         <p:nvPicPr>
-          <p:cNvPr id="187" name="Logo2018_72DPI.png" descr="Logo2018_72DPI.png"/>
+          <p:cNvPr id="178" name="Logo2018_72DPI.png" descr="Logo2018_72DPI.png"/>
           <p:cNvPicPr>
             <a:picLocks noChangeAspect="1"/>
           </p:cNvPicPr>
@@ -3930,7 +3930,7 @@
       </p:grpSpPr>
       <p:pic>
         <p:nvPicPr>
-          <p:cNvPr id="189" name="questions-to-ask-a-guy-1.jpg" descr="questions-to-ask-a-guy-1.jpg"/>
+          <p:cNvPr id="180" name="questions-to-ask-a-guy-1.jpg" descr="questions-to-ask-a-guy-1.jpg"/>
           <p:cNvPicPr>
             <a:picLocks noChangeAspect="1"/>
           </p:cNvPicPr>
@@ -3959,7 +3959,7 @@
       </p:pic>
       <p:pic>
         <p:nvPicPr>
-          <p:cNvPr id="190" name="Logo2018_72DPI.png" descr="Logo2018_72DPI.png"/>
+          <p:cNvPr id="181" name="Logo2018_72DPI.png" descr="Logo2018_72DPI.png"/>
           <p:cNvPicPr>
             <a:picLocks noChangeAspect="1"/>
           </p:cNvPicPr>
@@ -3986,6 +3986,46 @@
           </a:ln>
         </p:spPr>
       </p:pic>
+      <p:sp>
+        <p:nvSpPr>
+          <p:cNvPr id="182" name="@bpmericle"/>
+          <p:cNvSpPr txBox="1"/>
+          <p:nvPr/>
+        </p:nvSpPr>
+        <p:spPr>
+          <a:xfrm>
+            <a:off x="21206055" y="12759039"/>
+            <a:ext cx="3523770" cy="711201"/>
+          </a:xfrm>
+          <a:prstGeom prst="rect">
+            <a:avLst/>
+          </a:prstGeom>
+          <a:ln w="12700">
+            <a:miter lim="400000"/>
+          </a:ln>
+          <a:extLst>
+            <a:ext uri="{C572A759-6A51-4108-AA02-DFA0A04FC94B}">
+              <ma14:wrappingTextBoxFlag xmlns:ma14="http://schemas.microsoft.com/office/mac/drawingml/2011/main" val="1"/>
+            </a:ext>
+          </a:extLst>
+        </p:spPr>
+        <p:txBody>
+          <a:bodyPr lIns="50800" tIns="50800" rIns="50800" bIns="50800" anchor="ctr">
+            <a:spAutoFit/>
+          </a:bodyPr>
+          <a:lstStyle>
+            <a:lvl1pPr>
+              <a:defRPr sz="4000"/>
+            </a:lvl1pPr>
+          </a:lstStyle>
+          <a:p>
+            <a:pPr/>
+            <a:r>
+              <a:t>@bpmericle</a:t>
+            </a:r>
+          </a:p>
+        </p:txBody>
+      </p:sp>
     </p:spTree>
   </p:cSld>
   <p:clrMapOvr>
@@ -4014,7 +4054,7 @@
       </p:grpSpPr>
       <p:sp>
         <p:nvSpPr>
-          <p:cNvPr id="192" name="Thank You!"/>
+          <p:cNvPr id="184" name="Thank You!"/>
           <p:cNvSpPr txBox="1"/>
           <p:nvPr/>
         </p:nvSpPr>
@@ -4054,7 +4094,7 @@
       </p:sp>
       <p:pic>
         <p:nvPicPr>
-          <p:cNvPr id="193" name="me.png" descr="me.png"/>
+          <p:cNvPr id="185" name="me.png" descr="me.png"/>
           <p:cNvPicPr>
             <a:picLocks noChangeAspect="1"/>
           </p:cNvPicPr>
@@ -4083,7 +4123,7 @@
       </p:pic>
       <p:pic>
         <p:nvPicPr>
-          <p:cNvPr id="194" name="Logo2018_72DPI.png" descr="Logo2018_72DPI.png"/>
+          <p:cNvPr id="186" name="Logo2018_72DPI.png" descr="Logo2018_72DPI.png"/>
           <p:cNvPicPr>
             <a:picLocks noChangeAspect="1"/>
           </p:cNvPicPr>
@@ -4112,7 +4152,7 @@
       </p:pic>
       <p:grpSp>
         <p:nvGrpSpPr>
-          <p:cNvPr id="197" name="Group"/>
+          <p:cNvPr id="189" name="Group"/>
           <p:cNvGrpSpPr/>
           <p:nvPr/>
         </p:nvGrpSpPr>
@@ -4126,14 +4166,14 @@
         </p:grpSpPr>
         <p:sp>
           <p:nvSpPr>
-            <p:cNvPr id="195" name="Email:"/>
+            <p:cNvPr id="187" name="Email:"/>
             <p:cNvSpPr txBox="1"/>
             <p:nvPr/>
           </p:nvSpPr>
           <p:spPr>
             <a:xfrm>
-              <a:off x="-88576" y="0"/>
-              <a:ext cx="2019922" cy="863600"/>
+              <a:off x="-88576" y="-1"/>
+              <a:ext cx="2019921" cy="863601"/>
             </a:xfrm>
             <a:prstGeom prst="rect">
               <a:avLst/>
@@ -4174,14 +4214,14 @@
         </p:sp>
         <p:sp>
           <p:nvSpPr>
-            <p:cNvPr id="196" name="brian.mericle@gmail.com"/>
+            <p:cNvPr id="188" name="brian.mericle@gmail.com"/>
             <p:cNvSpPr txBox="1"/>
             <p:nvPr/>
           </p:nvSpPr>
           <p:spPr>
             <a:xfrm>
-              <a:off x="2177571" y="0"/>
-              <a:ext cx="7290436" cy="863600"/>
+              <a:off x="2177571" y="-1"/>
+              <a:ext cx="7290436" cy="863601"/>
             </a:xfrm>
             <a:prstGeom prst="rect">
               <a:avLst/>
@@ -4225,7 +4265,7 @@
       </p:grpSp>
       <p:grpSp>
         <p:nvGrpSpPr>
-          <p:cNvPr id="200" name="Group"/>
+          <p:cNvPr id="192" name="Group"/>
           <p:cNvGrpSpPr/>
           <p:nvPr/>
         </p:nvGrpSpPr>
@@ -4239,14 +4279,14 @@
         </p:grpSpPr>
         <p:sp>
           <p:nvSpPr>
-            <p:cNvPr id="198" name="Twitter:"/>
+            <p:cNvPr id="190" name="Twitter:"/>
             <p:cNvSpPr txBox="1"/>
             <p:nvPr/>
           </p:nvSpPr>
           <p:spPr>
             <a:xfrm>
-              <a:off x="-126400" y="0"/>
-              <a:ext cx="2360365" cy="863600"/>
+              <a:off x="-126400" y="-1"/>
+              <a:ext cx="2360365" cy="863601"/>
             </a:xfrm>
             <a:prstGeom prst="rect">
               <a:avLst/>
@@ -4287,14 +4327,14 @@
         </p:sp>
         <p:sp>
           <p:nvSpPr>
-            <p:cNvPr id="199" name="@bpmericle"/>
+            <p:cNvPr id="191" name="@bpmericle"/>
             <p:cNvSpPr txBox="1"/>
             <p:nvPr/>
           </p:nvSpPr>
           <p:spPr>
             <a:xfrm>
-              <a:off x="2442366" y="0"/>
-              <a:ext cx="3479801" cy="863600"/>
+              <a:off x="2442366" y="-1"/>
+              <a:ext cx="3479801" cy="863601"/>
             </a:xfrm>
             <a:prstGeom prst="rect">
               <a:avLst/>
@@ -4338,7 +4378,7 @@
       </p:grpSp>
       <p:grpSp>
         <p:nvGrpSpPr>
-          <p:cNvPr id="203" name="Group"/>
+          <p:cNvPr id="195" name="Group"/>
           <p:cNvGrpSpPr/>
           <p:nvPr/>
         </p:nvGrpSpPr>
@@ -4352,7 +4392,7 @@
         </p:grpSpPr>
         <p:sp>
           <p:nvSpPr>
-            <p:cNvPr id="201" name="LinkedIn:"/>
+            <p:cNvPr id="193" name="LinkedIn:"/>
             <p:cNvSpPr txBox="1"/>
             <p:nvPr/>
           </p:nvSpPr>
@@ -4400,14 +4440,14 @@
         </p:sp>
         <p:sp>
           <p:nvSpPr>
-            <p:cNvPr id="202" name="https://www.linkedin.com/in/brianpmericle/"/>
+            <p:cNvPr id="194" name="https://www.linkedin.com/in/brianpmericle/"/>
             <p:cNvSpPr txBox="1"/>
             <p:nvPr/>
           </p:nvSpPr>
           <p:spPr>
             <a:xfrm>
               <a:off x="3060856" y="0"/>
-              <a:ext cx="12591238" cy="889000"/>
+              <a:ext cx="12591238" cy="889001"/>
             </a:xfrm>
             <a:prstGeom prst="rect">
               <a:avLst/>
@@ -4451,7 +4491,7 @@
       </p:grpSp>
       <p:sp>
         <p:nvSpPr>
-          <p:cNvPr id="204" name="Slides:"/>
+          <p:cNvPr id="196" name="Slides:"/>
           <p:cNvSpPr txBox="1"/>
           <p:nvPr/>
         </p:nvSpPr>
@@ -4496,7 +4536,7 @@
       </p:sp>
       <p:sp>
         <p:nvSpPr>
-          <p:cNvPr id="205" name="Search for “Gluecon 2018 JaC” on https://www.slideshare.net"/>
+          <p:cNvPr id="197" name="Search for “Gluecon 2018 JaC” on https://www.slideshare.net"/>
           <p:cNvSpPr txBox="1"/>
           <p:nvPr/>
         </p:nvSpPr>
@@ -4540,7 +4580,7 @@
       </p:sp>
       <p:grpSp>
         <p:nvGrpSpPr>
-          <p:cNvPr id="208" name="Group"/>
+          <p:cNvPr id="200" name="Group"/>
           <p:cNvGrpSpPr/>
           <p:nvPr/>
         </p:nvGrpSpPr>
@@ -4554,14 +4594,14 @@
         </p:grpSpPr>
         <p:sp>
           <p:nvSpPr>
-            <p:cNvPr id="206" name="Github:"/>
+            <p:cNvPr id="198" name="Github:"/>
             <p:cNvSpPr txBox="1"/>
             <p:nvPr/>
           </p:nvSpPr>
           <p:spPr>
             <a:xfrm>
-              <a:off x="-87376" y="0"/>
-              <a:ext cx="2371217" cy="863600"/>
+              <a:off x="-87376" y="-1"/>
+              <a:ext cx="2371217" cy="863601"/>
             </a:xfrm>
             <a:prstGeom prst="rect">
               <a:avLst/>
@@ -4602,14 +4642,14 @@
         </p:sp>
         <p:sp>
           <p:nvSpPr>
-            <p:cNvPr id="207" name="https://github.com/bpmericle"/>
+            <p:cNvPr id="199" name="https://github.com/bpmericle"/>
             <p:cNvSpPr txBox="1"/>
             <p:nvPr/>
           </p:nvSpPr>
           <p:spPr>
             <a:xfrm>
-              <a:off x="2531266" y="0"/>
-              <a:ext cx="8300721" cy="863600"/>
+              <a:off x="2531266" y="-1"/>
+              <a:ext cx="8300721" cy="863601"/>
             </a:xfrm>
             <a:prstGeom prst="rect">
               <a:avLst/>
@@ -4679,7 +4719,7 @@
       </p:grpSpPr>
       <p:sp>
         <p:nvSpPr>
-          <p:cNvPr id="210" name="Resources"/>
+          <p:cNvPr id="202" name="Resources"/>
           <p:cNvSpPr txBox="1"/>
           <p:nvPr>
             <p:ph type="title"/>
@@ -4707,7 +4747,7 @@
       </p:sp>
       <p:pic>
         <p:nvPicPr>
-          <p:cNvPr id="211" name="Logo2018_72DPI.png" descr="Logo2018_72DPI.png"/>
+          <p:cNvPr id="203" name="Logo2018_72DPI.png" descr="Logo2018_72DPI.png"/>
           <p:cNvPicPr>
             <a:picLocks noChangeAspect="1"/>
           </p:cNvPicPr>
@@ -4736,7 +4776,7 @@
       </p:pic>
       <p:sp>
         <p:nvSpPr>
-          <p:cNvPr id="212" name="@bpmericle"/>
+          <p:cNvPr id="204" name="@bpmericle"/>
           <p:cNvSpPr txBox="1"/>
           <p:nvPr/>
         </p:nvSpPr>
@@ -4776,7 +4816,7 @@
       </p:sp>
       <p:sp>
         <p:nvSpPr>
-          <p:cNvPr id="213" name="Job DSL Plugin:"/>
+          <p:cNvPr id="205" name="Job DSL Plugin:"/>
           <p:cNvSpPr txBox="1"/>
           <p:nvPr/>
         </p:nvSpPr>
@@ -4821,7 +4861,7 @@
       </p:sp>
       <p:sp>
         <p:nvSpPr>
-          <p:cNvPr id="214" name="https://github.com/jenkinsci/job-dsl-plugin/wiki"/>
+          <p:cNvPr id="206" name="https://github.com/jenkinsci/job-dsl-plugin/wiki"/>
           <p:cNvSpPr txBox="1"/>
           <p:nvPr/>
         </p:nvSpPr>
@@ -4868,7 +4908,7 @@
       </p:sp>
       <p:sp>
         <p:nvSpPr>
-          <p:cNvPr id="215" name="Authorize Project Plugin:"/>
+          <p:cNvPr id="207" name="Authorize Project Plugin:"/>
           <p:cNvSpPr txBox="1"/>
           <p:nvPr/>
         </p:nvSpPr>
@@ -4913,14 +4953,14 @@
       </p:sp>
       <p:sp>
         <p:nvSpPr>
-          <p:cNvPr id="216" name="https://wiki.jenkins.io/display/JENKINS/Authorize+Project+plugin"/>
+          <p:cNvPr id="208" name="https://wiki.jenkins.io/display/JENKINS/Authorize+Project+plugin"/>
           <p:cNvSpPr txBox="1"/>
           <p:nvPr/>
         </p:nvSpPr>
         <p:spPr>
           <a:xfrm>
-            <a:off x="7369211" y="6278480"/>
-            <a:ext cx="13624866" cy="660401"/>
+            <a:off x="7369212" y="6278480"/>
+            <a:ext cx="13624865" cy="660401"/>
           </a:xfrm>
           <a:prstGeom prst="rect">
             <a:avLst/>
@@ -4960,7 +5000,7 @@
       </p:sp>
       <p:sp>
         <p:nvSpPr>
-          <p:cNvPr id="217" name="Job DSL API:"/>
+          <p:cNvPr id="209" name="Job DSL API:"/>
           <p:cNvSpPr txBox="1"/>
           <p:nvPr/>
         </p:nvSpPr>
@@ -5005,14 +5045,14 @@
       </p:sp>
       <p:sp>
         <p:nvSpPr>
-          <p:cNvPr id="218" name="https://jenkinsci.github.io/job-dsl-plugin/"/>
+          <p:cNvPr id="210" name="https://jenkinsci.github.io/job-dsl-plugin/"/>
           <p:cNvSpPr txBox="1"/>
           <p:nvPr/>
         </p:nvSpPr>
         <p:spPr>
           <a:xfrm>
-            <a:off x="7369211" y="3165907"/>
-            <a:ext cx="8495908" cy="660401"/>
+            <a:off x="7369212" y="3165907"/>
+            <a:ext cx="8495907" cy="660401"/>
           </a:xfrm>
           <a:prstGeom prst="rect">
             <a:avLst/>
@@ -5052,7 +5092,7 @@
       </p:sp>
       <p:sp>
         <p:nvSpPr>
-          <p:cNvPr id="219" name="Script Security Plugin:"/>
+          <p:cNvPr id="211" name="Script Security Plugin:"/>
           <p:cNvSpPr txBox="1"/>
           <p:nvPr/>
         </p:nvSpPr>
@@ -5097,14 +5137,14 @@
       </p:sp>
       <p:sp>
         <p:nvSpPr>
-          <p:cNvPr id="220" name="https://wiki.jenkins.io/display/JENKINS/Script+Security+Plugin"/>
+          <p:cNvPr id="212" name="https://wiki.jenkins.io/display/JENKINS/Script+Security+Plugin"/>
           <p:cNvSpPr txBox="1"/>
           <p:nvPr/>
         </p:nvSpPr>
         <p:spPr>
           <a:xfrm>
             <a:off x="7369211" y="5240956"/>
-            <a:ext cx="13110326" cy="660401"/>
+            <a:ext cx="13110325" cy="660401"/>
           </a:xfrm>
           <a:prstGeom prst="rect">
             <a:avLst/>
@@ -5144,7 +5184,7 @@
       </p:sp>
       <p:sp>
         <p:nvSpPr>
-          <p:cNvPr id="221" name="Groovy API:"/>
+          <p:cNvPr id="213" name="Groovy API:"/>
           <p:cNvSpPr txBox="1"/>
           <p:nvPr/>
         </p:nvSpPr>
@@ -5189,14 +5229,14 @@
       </p:sp>
       <p:sp>
         <p:nvSpPr>
-          <p:cNvPr id="222" name="http://groovy-lang.org/gdk.html"/>
+          <p:cNvPr id="214" name="http://groovy-lang.org/gdk.html"/>
           <p:cNvSpPr txBox="1"/>
           <p:nvPr/>
         </p:nvSpPr>
         <p:spPr>
           <a:xfrm>
-            <a:off x="7369211" y="4203432"/>
-            <a:ext cx="6607380" cy="660401"/>
+            <a:off x="7369212" y="4203432"/>
+            <a:ext cx="6607379" cy="660401"/>
           </a:xfrm>
           <a:prstGeom prst="rect">
             <a:avLst/>
@@ -5236,7 +5276,7 @@
       </p:sp>
       <p:sp>
         <p:nvSpPr>
-          <p:cNvPr id="223" name="Pipeline Plugin:"/>
+          <p:cNvPr id="215" name="Pipeline Plugin:"/>
           <p:cNvSpPr txBox="1"/>
           <p:nvPr/>
         </p:nvSpPr>
@@ -5281,13 +5321,13 @@
       </p:sp>
       <p:sp>
         <p:nvSpPr>
-          <p:cNvPr id="224" name="https://jenkins.io/doc/book/pipeline/"/>
+          <p:cNvPr id="216" name="https://jenkins.io/doc/book/pipeline/"/>
           <p:cNvSpPr txBox="1"/>
           <p:nvPr/>
         </p:nvSpPr>
         <p:spPr>
           <a:xfrm>
-            <a:off x="7369211" y="7316004"/>
+            <a:off x="7369212" y="7316004"/>
             <a:ext cx="7557047" cy="660401"/>
           </a:xfrm>
           <a:prstGeom prst="rect">
@@ -5328,7 +5368,7 @@
       </p:sp>
       <p:sp>
         <p:nvSpPr>
-          <p:cNvPr id="225" name="Pipeline Declarative Model:"/>
+          <p:cNvPr id="217" name="Pipeline Declarative Model:"/>
           <p:cNvSpPr txBox="1"/>
           <p:nvPr/>
         </p:nvSpPr>
@@ -5373,14 +5413,14 @@
       </p:sp>
       <p:sp>
         <p:nvSpPr>
-          <p:cNvPr id="226" name="https://github.com/jenkinsci/pipeline-model-definition-plugin/wiki/getting-started"/>
+          <p:cNvPr id="218" name="https://github.com/jenkinsci/pipeline-model-definition-plugin/wiki/getting-started"/>
           <p:cNvSpPr txBox="1"/>
           <p:nvPr/>
         </p:nvSpPr>
         <p:spPr>
           <a:xfrm>
-            <a:off x="7369211" y="8353528"/>
-            <a:ext cx="16807499" cy="660401"/>
+            <a:off x="7369212" y="8353528"/>
+            <a:ext cx="16807498" cy="660401"/>
           </a:xfrm>
           <a:prstGeom prst="rect">
             <a:avLst/>
@@ -5420,7 +5460,7 @@
       </p:sp>
       <p:sp>
         <p:nvSpPr>
-          <p:cNvPr id="227" name="Pipeline Shared Libraries:"/>
+          <p:cNvPr id="219" name="Pipeline Shared Libraries:"/>
           <p:cNvSpPr txBox="1"/>
           <p:nvPr/>
         </p:nvSpPr>
@@ -5465,14 +5505,14 @@
       </p:sp>
       <p:sp>
         <p:nvSpPr>
-          <p:cNvPr id="228" name="https://jenkins.io/doc/book/pipeline/shared-libraries/"/>
+          <p:cNvPr id="220" name="https://jenkins.io/doc/book/pipeline/shared-libraries/"/>
           <p:cNvSpPr txBox="1"/>
           <p:nvPr/>
         </p:nvSpPr>
         <p:spPr>
           <a:xfrm>
             <a:off x="7369211" y="9391053"/>
-            <a:ext cx="10968521" cy="660401"/>
+            <a:ext cx="10968522" cy="660401"/>
           </a:xfrm>
           <a:prstGeom prst="rect">
             <a:avLst/>
@@ -5512,7 +5552,7 @@
       </p:sp>
       <p:sp>
         <p:nvSpPr>
-          <p:cNvPr id="229" name="Pipeline Steps:"/>
+          <p:cNvPr id="221" name="Pipeline Steps:"/>
           <p:cNvSpPr txBox="1"/>
           <p:nvPr/>
         </p:nvSpPr>
@@ -5557,14 +5597,14 @@
       </p:sp>
       <p:sp>
         <p:nvSpPr>
-          <p:cNvPr id="230" name="https://jenkins.io/doc/pipeline/steps/"/>
+          <p:cNvPr id="222" name="https://jenkins.io/doc/pipeline/steps/"/>
           <p:cNvSpPr txBox="1"/>
           <p:nvPr/>
         </p:nvSpPr>
         <p:spPr>
           <a:xfrm>
-            <a:off x="7369211" y="10428577"/>
-            <a:ext cx="7661365" cy="660401"/>
+            <a:off x="7369212" y="10428577"/>
+            <a:ext cx="7661364" cy="660401"/>
           </a:xfrm>
           <a:prstGeom prst="rect">
             <a:avLst/>
@@ -5604,7 +5644,7 @@
       </p:sp>
       <p:sp>
         <p:nvSpPr>
-          <p:cNvPr id="231" name="Pipeline Basic Steps:"/>
+          <p:cNvPr id="223" name="Pipeline Basic Steps:"/>
           <p:cNvSpPr txBox="1"/>
           <p:nvPr/>
         </p:nvSpPr>
@@ -5649,13 +5689,13 @@
       </p:sp>
       <p:sp>
         <p:nvSpPr>
-          <p:cNvPr id="232" name="https://jenkins.io/doc/pipeline/steps/workflow-basic-steps/"/>
+          <p:cNvPr id="224" name="https://jenkins.io/doc/pipeline/steps/workflow-basic-steps/"/>
           <p:cNvSpPr txBox="1"/>
           <p:nvPr/>
         </p:nvSpPr>
         <p:spPr>
           <a:xfrm>
-            <a:off x="7369211" y="11466101"/>
+            <a:off x="7369212" y="11466101"/>
             <a:ext cx="12230203" cy="660401"/>
           </a:xfrm>
           <a:prstGeom prst="rect">
@@ -5696,13 +5736,13 @@
       </p:sp>
       <p:sp>
         <p:nvSpPr>
-          <p:cNvPr id="233" name="Pipeline Utility Steps:"/>
+          <p:cNvPr id="225" name="Pipeline Utility Steps:"/>
           <p:cNvSpPr txBox="1"/>
           <p:nvPr/>
         </p:nvSpPr>
         <p:spPr>
           <a:xfrm>
-            <a:off x="1660597" y="12465526"/>
+            <a:off x="1660597" y="12465525"/>
             <a:ext cx="5567847" cy="736601"/>
           </a:xfrm>
           <a:prstGeom prst="rect">
@@ -5741,14 +5781,14 @@
       </p:sp>
       <p:sp>
         <p:nvSpPr>
-          <p:cNvPr id="234" name="https://jenkins.io/doc/pipeline/steps/pipeline-utility-steps/"/>
+          <p:cNvPr id="226" name="https://jenkins.io/doc/pipeline/steps/pipeline-utility-steps/"/>
           <p:cNvSpPr txBox="1"/>
           <p:nvPr/>
         </p:nvSpPr>
         <p:spPr>
           <a:xfrm>
-            <a:off x="7369211" y="12503626"/>
-            <a:ext cx="11995253" cy="660401"/>
+            <a:off x="7369211" y="12503625"/>
+            <a:ext cx="11995252" cy="660401"/>
           </a:xfrm>
           <a:prstGeom prst="rect">
             <a:avLst/>
@@ -6028,519 +6068,144 @@
           </a:p>
         </p:txBody>
       </p:sp>
-      <p:grpSp>
-        <p:nvGrpSpPr>
-          <p:cNvPr id="138" name="Group"/>
-          <p:cNvGrpSpPr/>
+      <p:sp>
+        <p:nvSpPr>
+          <p:cNvPr id="133" name="Groovy-based DSL"/>
+          <p:cNvSpPr txBox="1"/>
           <p:nvPr/>
-        </p:nvGrpSpPr>
-        <p:grpSpPr>
-          <a:xfrm>
-            <a:off x="2841080" y="5486399"/>
-            <a:ext cx="18701841" cy="1168401"/>
-            <a:chOff x="14915" y="0"/>
-            <a:chExt cx="18701840" cy="1168400"/>
-          </a:xfrm>
-        </p:grpSpPr>
-        <p:sp>
-          <p:nvSpPr>
-            <p:cNvPr id="133" name="Job DSL Plugin"/>
-            <p:cNvSpPr txBox="1"/>
-            <p:nvPr/>
-          </p:nvSpPr>
-          <p:spPr>
-            <a:xfrm>
-              <a:off x="14915" y="-1"/>
-              <a:ext cx="6209681" cy="1168401"/>
-            </a:xfrm>
-            <a:prstGeom prst="rect">
-              <a:avLst/>
-            </a:prstGeom>
-            <a:noFill/>
-            <a:ln w="12700" cap="flat">
-              <a:noFill/>
-              <a:miter lim="400000"/>
-            </a:ln>
-            <a:effectLst/>
-            <a:extLst>
-              <a:ext uri="{C572A759-6A51-4108-AA02-DFA0A04FC94B}">
-                <ma14:wrappingTextBoxFlag xmlns:ma14="http://schemas.microsoft.com/office/mac/drawingml/2011/main" val="1"/>
-              </a:ext>
-            </a:extLst>
-          </p:spPr>
-          <p:txBody>
-            <a:bodyPr wrap="none" lIns="50800" tIns="50800" rIns="50800" bIns="50800" numCol="1" anchor="ctr">
-              <a:spAutoFit/>
-            </a:bodyPr>
-            <a:lstStyle>
-              <a:lvl1pPr>
-                <a:defRPr sz="7000">
-                  <a:latin typeface="Helvetica"/>
-                  <a:ea typeface="Helvetica"/>
-                  <a:cs typeface="Helvetica"/>
-                  <a:sym typeface="Helvetica"/>
-                </a:defRPr>
-              </a:lvl1pPr>
-            </a:lstStyle>
-            <a:p>
-              <a:pPr/>
-              <a:r>
-                <a:t>Job DSL Plugin</a:t>
-              </a:r>
-            </a:p>
-          </p:txBody>
-        </p:sp>
-        <p:sp>
-          <p:nvSpPr>
-            <p:cNvPr id="134" name="="/>
-            <p:cNvSpPr txBox="1"/>
-            <p:nvPr/>
-          </p:nvSpPr>
-          <p:spPr>
-            <a:xfrm>
-              <a:off x="7132237" y="-1"/>
-              <a:ext cx="633463" cy="1168401"/>
-            </a:xfrm>
-            <a:prstGeom prst="rect">
-              <a:avLst/>
-            </a:prstGeom>
-            <a:noFill/>
-            <a:ln w="12700" cap="flat">
-              <a:noFill/>
-              <a:miter lim="400000"/>
-            </a:ln>
-            <a:effectLst/>
-            <a:extLst>
-              <a:ext uri="{C572A759-6A51-4108-AA02-DFA0A04FC94B}">
-                <ma14:wrappingTextBoxFlag xmlns:ma14="http://schemas.microsoft.com/office/mac/drawingml/2011/main" val="1"/>
-              </a:ext>
-            </a:extLst>
-          </p:spPr>
-          <p:txBody>
-            <a:bodyPr wrap="none" lIns="50800" tIns="50800" rIns="50800" bIns="50800" numCol="1" anchor="ctr">
-              <a:spAutoFit/>
-            </a:bodyPr>
-            <a:lstStyle>
-              <a:lvl1pPr>
-                <a:defRPr b="1" sz="7000">
-                  <a:latin typeface="Helvetica"/>
-                  <a:ea typeface="Helvetica"/>
-                  <a:cs typeface="Helvetica"/>
-                  <a:sym typeface="Helvetica"/>
-                </a:defRPr>
-              </a:lvl1pPr>
-            </a:lstStyle>
-            <a:p>
-              <a:pPr/>
-              <a:r>
-                <a:t>=</a:t>
-              </a:r>
-            </a:p>
-          </p:txBody>
-        </p:sp>
-        <p:sp>
-          <p:nvSpPr>
-            <p:cNvPr id="135" name="DSL"/>
-            <p:cNvSpPr txBox="1"/>
-            <p:nvPr/>
-          </p:nvSpPr>
-          <p:spPr>
-            <a:xfrm>
-              <a:off x="8633396" y="-1"/>
-              <a:ext cx="1843684" cy="1168401"/>
-            </a:xfrm>
-            <a:prstGeom prst="rect">
-              <a:avLst/>
-            </a:prstGeom>
-            <a:noFill/>
-            <a:ln w="12700" cap="flat">
-              <a:noFill/>
-              <a:miter lim="400000"/>
-            </a:ln>
-            <a:effectLst/>
-            <a:extLst>
-              <a:ext uri="{C572A759-6A51-4108-AA02-DFA0A04FC94B}">
-                <ma14:wrappingTextBoxFlag xmlns:ma14="http://schemas.microsoft.com/office/mac/drawingml/2011/main" val="1"/>
-              </a:ext>
-            </a:extLst>
-          </p:spPr>
-          <p:txBody>
-            <a:bodyPr wrap="none" lIns="50800" tIns="50800" rIns="50800" bIns="50800" numCol="1" anchor="ctr">
-              <a:spAutoFit/>
-            </a:bodyPr>
-            <a:lstStyle>
-              <a:lvl1pPr>
-                <a:defRPr sz="7000">
-                  <a:latin typeface="Helvetica"/>
-                  <a:ea typeface="Helvetica"/>
-                  <a:cs typeface="Helvetica"/>
-                  <a:sym typeface="Helvetica"/>
-                </a:defRPr>
-              </a:lvl1pPr>
-            </a:lstStyle>
-            <a:p>
-              <a:pPr/>
-              <a:r>
-                <a:t>DSL</a:t>
-              </a:r>
-            </a:p>
-          </p:txBody>
-        </p:sp>
-        <p:sp>
-          <p:nvSpPr>
-            <p:cNvPr id="136" name="+"/>
-            <p:cNvSpPr txBox="1"/>
-            <p:nvPr/>
-          </p:nvSpPr>
-          <p:spPr>
-            <a:xfrm>
-              <a:off x="11344774" y="-1"/>
-              <a:ext cx="633464" cy="1168401"/>
-            </a:xfrm>
-            <a:prstGeom prst="rect">
-              <a:avLst/>
-            </a:prstGeom>
-            <a:noFill/>
-            <a:ln w="12700" cap="flat">
-              <a:noFill/>
-              <a:miter lim="400000"/>
-            </a:ln>
-            <a:effectLst/>
-            <a:extLst>
-              <a:ext uri="{C572A759-6A51-4108-AA02-DFA0A04FC94B}">
-                <ma14:wrappingTextBoxFlag xmlns:ma14="http://schemas.microsoft.com/office/mac/drawingml/2011/main" val="1"/>
-              </a:ext>
-            </a:extLst>
-          </p:spPr>
-          <p:txBody>
-            <a:bodyPr wrap="none" lIns="50800" tIns="50800" rIns="50800" bIns="50800" numCol="1" anchor="ctr">
-              <a:spAutoFit/>
-            </a:bodyPr>
-            <a:lstStyle>
-              <a:lvl1pPr>
-                <a:defRPr b="1" sz="7000">
-                  <a:latin typeface="Helvetica"/>
-                  <a:ea typeface="Helvetica"/>
-                  <a:cs typeface="Helvetica"/>
-                  <a:sym typeface="Helvetica"/>
-                </a:defRPr>
-              </a:lvl1pPr>
-            </a:lstStyle>
-            <a:p>
-              <a:pPr/>
-              <a:r>
-                <a:t>+</a:t>
-              </a:r>
-            </a:p>
-          </p:txBody>
-        </p:sp>
-        <p:sp>
-          <p:nvSpPr>
-            <p:cNvPr id="137" name="Jenkins Plugin"/>
-            <p:cNvSpPr txBox="1"/>
-            <p:nvPr/>
-          </p:nvSpPr>
-          <p:spPr>
-            <a:xfrm>
-              <a:off x="12869968" y="-1"/>
-              <a:ext cx="5846788" cy="1168401"/>
-            </a:xfrm>
-            <a:prstGeom prst="rect">
-              <a:avLst/>
-            </a:prstGeom>
-            <a:noFill/>
-            <a:ln w="12700" cap="flat">
-              <a:noFill/>
-              <a:miter lim="400000"/>
-            </a:ln>
-            <a:effectLst/>
-            <a:extLst>
-              <a:ext uri="{C572A759-6A51-4108-AA02-DFA0A04FC94B}">
-                <ma14:wrappingTextBoxFlag xmlns:ma14="http://schemas.microsoft.com/office/mac/drawingml/2011/main" val="1"/>
-              </a:ext>
-            </a:extLst>
-          </p:spPr>
-          <p:txBody>
-            <a:bodyPr wrap="none" lIns="50800" tIns="50800" rIns="50800" bIns="50800" numCol="1" anchor="ctr">
-              <a:spAutoFit/>
-            </a:bodyPr>
-            <a:lstStyle>
-              <a:lvl1pPr>
-                <a:defRPr sz="7000">
-                  <a:latin typeface="Helvetica"/>
-                  <a:ea typeface="Helvetica"/>
-                  <a:cs typeface="Helvetica"/>
-                  <a:sym typeface="Helvetica"/>
-                </a:defRPr>
-              </a:lvl1pPr>
-            </a:lstStyle>
-            <a:p>
-              <a:pPr/>
-              <a:r>
-                <a:t>Jenkins Plugin</a:t>
-              </a:r>
-            </a:p>
-          </p:txBody>
-        </p:sp>
-      </p:grpSp>
-      <p:grpSp>
-        <p:nvGrpSpPr>
-          <p:cNvPr id="144" name="Group"/>
-          <p:cNvGrpSpPr/>
+        </p:nvSpPr>
+        <p:spPr>
+          <a:xfrm>
+            <a:off x="4223008" y="6273799"/>
+            <a:ext cx="7674273" cy="1168401"/>
+          </a:xfrm>
+          <a:prstGeom prst="rect">
+            <a:avLst/>
+          </a:prstGeom>
+          <a:ln w="12700">
+            <a:miter lim="400000"/>
+          </a:ln>
+          <a:extLst>
+            <a:ext uri="{C572A759-6A51-4108-AA02-DFA0A04FC94B}">
+              <ma14:wrappingTextBoxFlag xmlns:ma14="http://schemas.microsoft.com/office/mac/drawingml/2011/main" val="1"/>
+            </a:ext>
+          </a:extLst>
+        </p:spPr>
+        <p:txBody>
+          <a:bodyPr wrap="none" lIns="50800" tIns="50800" rIns="50800" bIns="50800" anchor="ctr">
+            <a:spAutoFit/>
+          </a:bodyPr>
+          <a:lstStyle>
+            <a:lvl1pPr>
+              <a:defRPr sz="7000">
+                <a:latin typeface="Helvetica"/>
+                <a:ea typeface="Helvetica"/>
+                <a:cs typeface="Helvetica"/>
+                <a:sym typeface="Helvetica"/>
+              </a:defRPr>
+            </a:lvl1pPr>
+          </a:lstStyle>
+          <a:p>
+            <a:pPr/>
+            <a:r>
+              <a:t>Groovy-based DSL</a:t>
+            </a:r>
+          </a:p>
+        </p:txBody>
+      </p:sp>
+      <p:sp>
+        <p:nvSpPr>
+          <p:cNvPr id="134" name="+"/>
+          <p:cNvSpPr txBox="1"/>
           <p:nvPr/>
-        </p:nvGrpSpPr>
-        <p:grpSpPr>
-          <a:xfrm>
-            <a:off x="2672330" y="8538543"/>
-            <a:ext cx="19039340" cy="1168401"/>
-            <a:chOff x="-100333" y="0"/>
-            <a:chExt cx="19039338" cy="1168400"/>
-          </a:xfrm>
-        </p:grpSpPr>
-        <p:sp>
-          <p:nvSpPr>
-            <p:cNvPr id="139" name="Pipeline Plugins"/>
-            <p:cNvSpPr txBox="1"/>
-            <p:nvPr/>
-          </p:nvSpPr>
-          <p:spPr>
-            <a:xfrm>
-              <a:off x="-100334" y="-1"/>
-              <a:ext cx="6440178" cy="1168401"/>
-            </a:xfrm>
-            <a:prstGeom prst="rect">
-              <a:avLst/>
-            </a:prstGeom>
-            <a:noFill/>
-            <a:ln w="12700" cap="flat">
-              <a:noFill/>
-              <a:miter lim="400000"/>
-            </a:ln>
-            <a:effectLst/>
-            <a:extLst>
-              <a:ext uri="{C572A759-6A51-4108-AA02-DFA0A04FC94B}">
-                <ma14:wrappingTextBoxFlag xmlns:ma14="http://schemas.microsoft.com/office/mac/drawingml/2011/main" val="1"/>
-              </a:ext>
-            </a:extLst>
-          </p:spPr>
-          <p:txBody>
-            <a:bodyPr wrap="none" lIns="50800" tIns="50800" rIns="50800" bIns="50800" numCol="1" anchor="ctr">
-              <a:spAutoFit/>
-            </a:bodyPr>
-            <a:lstStyle>
-              <a:lvl1pPr>
-                <a:defRPr sz="7000">
-                  <a:latin typeface="Helvetica"/>
-                  <a:ea typeface="Helvetica"/>
-                  <a:cs typeface="Helvetica"/>
-                  <a:sym typeface="Helvetica"/>
-                </a:defRPr>
-              </a:lvl1pPr>
-            </a:lstStyle>
-            <a:p>
-              <a:pPr/>
-              <a:r>
-                <a:t>Pipeline Plugins</a:t>
-              </a:r>
-            </a:p>
-          </p:txBody>
-        </p:sp>
-        <p:sp>
-          <p:nvSpPr>
-            <p:cNvPr id="140" name="="/>
-            <p:cNvSpPr txBox="1"/>
-            <p:nvPr/>
-          </p:nvSpPr>
-          <p:spPr>
-            <a:xfrm>
-              <a:off x="7132237" y="-1"/>
-              <a:ext cx="633463" cy="1168401"/>
-            </a:xfrm>
-            <a:prstGeom prst="rect">
-              <a:avLst/>
-            </a:prstGeom>
-            <a:noFill/>
-            <a:ln w="12700" cap="flat">
-              <a:noFill/>
-              <a:miter lim="400000"/>
-            </a:ln>
-            <a:effectLst/>
-            <a:extLst>
-              <a:ext uri="{C572A759-6A51-4108-AA02-DFA0A04FC94B}">
-                <ma14:wrappingTextBoxFlag xmlns:ma14="http://schemas.microsoft.com/office/mac/drawingml/2011/main" val="1"/>
-              </a:ext>
-            </a:extLst>
-          </p:spPr>
-          <p:txBody>
-            <a:bodyPr wrap="none" lIns="50800" tIns="50800" rIns="50800" bIns="50800" numCol="1" anchor="ctr">
-              <a:spAutoFit/>
-            </a:bodyPr>
-            <a:lstStyle>
-              <a:lvl1pPr>
-                <a:defRPr b="1" sz="7000">
-                  <a:latin typeface="Helvetica"/>
-                  <a:ea typeface="Helvetica"/>
-                  <a:cs typeface="Helvetica"/>
-                  <a:sym typeface="Helvetica"/>
-                </a:defRPr>
-              </a:lvl1pPr>
-            </a:lstStyle>
-            <a:p>
-              <a:pPr/>
-              <a:r>
-                <a:t>=</a:t>
-              </a:r>
-            </a:p>
-          </p:txBody>
-        </p:sp>
-        <p:sp>
-          <p:nvSpPr>
-            <p:cNvPr id="141" name="DSL"/>
-            <p:cNvSpPr txBox="1"/>
-            <p:nvPr/>
-          </p:nvSpPr>
-          <p:spPr>
-            <a:xfrm>
-              <a:off x="8633396" y="-1"/>
-              <a:ext cx="1843684" cy="1168401"/>
-            </a:xfrm>
-            <a:prstGeom prst="rect">
-              <a:avLst/>
-            </a:prstGeom>
-            <a:noFill/>
-            <a:ln w="12700" cap="flat">
-              <a:noFill/>
-              <a:miter lim="400000"/>
-            </a:ln>
-            <a:effectLst/>
-            <a:extLst>
-              <a:ext uri="{C572A759-6A51-4108-AA02-DFA0A04FC94B}">
-                <ma14:wrappingTextBoxFlag xmlns:ma14="http://schemas.microsoft.com/office/mac/drawingml/2011/main" val="1"/>
-              </a:ext>
-            </a:extLst>
-          </p:spPr>
-          <p:txBody>
-            <a:bodyPr wrap="none" lIns="50800" tIns="50800" rIns="50800" bIns="50800" numCol="1" anchor="ctr">
-              <a:spAutoFit/>
-            </a:bodyPr>
-            <a:lstStyle>
-              <a:lvl1pPr>
-                <a:defRPr sz="7000">
-                  <a:latin typeface="Helvetica"/>
-                  <a:ea typeface="Helvetica"/>
-                  <a:cs typeface="Helvetica"/>
-                  <a:sym typeface="Helvetica"/>
-                </a:defRPr>
-              </a:lvl1pPr>
-            </a:lstStyle>
-            <a:p>
-              <a:pPr/>
-              <a:r>
-                <a:t>DSL</a:t>
-              </a:r>
-            </a:p>
-          </p:txBody>
-        </p:sp>
-        <p:sp>
-          <p:nvSpPr>
-            <p:cNvPr id="142" name="+"/>
-            <p:cNvSpPr txBox="1"/>
-            <p:nvPr/>
-          </p:nvSpPr>
-          <p:spPr>
-            <a:xfrm>
-              <a:off x="11344774" y="-1"/>
-              <a:ext cx="633464" cy="1168401"/>
-            </a:xfrm>
-            <a:prstGeom prst="rect">
-              <a:avLst/>
-            </a:prstGeom>
-            <a:noFill/>
-            <a:ln w="12700" cap="flat">
-              <a:noFill/>
-              <a:miter lim="400000"/>
-            </a:ln>
-            <a:effectLst/>
-            <a:extLst>
-              <a:ext uri="{C572A759-6A51-4108-AA02-DFA0A04FC94B}">
-                <ma14:wrappingTextBoxFlag xmlns:ma14="http://schemas.microsoft.com/office/mac/drawingml/2011/main" val="1"/>
-              </a:ext>
-            </a:extLst>
-          </p:spPr>
-          <p:txBody>
-            <a:bodyPr wrap="none" lIns="50800" tIns="50800" rIns="50800" bIns="50800" numCol="1" anchor="ctr">
-              <a:spAutoFit/>
-            </a:bodyPr>
-            <a:lstStyle>
-              <a:lvl1pPr>
-                <a:defRPr b="1" sz="7000">
-                  <a:latin typeface="Helvetica"/>
-                  <a:ea typeface="Helvetica"/>
-                  <a:cs typeface="Helvetica"/>
-                  <a:sym typeface="Helvetica"/>
-                </a:defRPr>
-              </a:lvl1pPr>
-            </a:lstStyle>
-            <a:p>
-              <a:pPr/>
-              <a:r>
-                <a:t>+</a:t>
-              </a:r>
-            </a:p>
-          </p:txBody>
-        </p:sp>
-        <p:sp>
-          <p:nvSpPr>
-            <p:cNvPr id="143" name="Jenkins Plugins"/>
-            <p:cNvSpPr txBox="1"/>
-            <p:nvPr/>
-          </p:nvSpPr>
-          <p:spPr>
-            <a:xfrm>
-              <a:off x="12647717" y="-1"/>
-              <a:ext cx="6291289" cy="1168401"/>
-            </a:xfrm>
-            <a:prstGeom prst="rect">
-              <a:avLst/>
-            </a:prstGeom>
-            <a:noFill/>
-            <a:ln w="12700" cap="flat">
-              <a:noFill/>
-              <a:miter lim="400000"/>
-            </a:ln>
-            <a:effectLst/>
-            <a:extLst>
-              <a:ext uri="{C572A759-6A51-4108-AA02-DFA0A04FC94B}">
-                <ma14:wrappingTextBoxFlag xmlns:ma14="http://schemas.microsoft.com/office/mac/drawingml/2011/main" val="1"/>
-              </a:ext>
-            </a:extLst>
-          </p:spPr>
-          <p:txBody>
-            <a:bodyPr wrap="none" lIns="50800" tIns="50800" rIns="50800" bIns="50800" numCol="1" anchor="ctr">
-              <a:spAutoFit/>
-            </a:bodyPr>
-            <a:lstStyle>
-              <a:lvl1pPr>
-                <a:defRPr sz="7000">
-                  <a:latin typeface="Helvetica"/>
-                  <a:ea typeface="Helvetica"/>
-                  <a:cs typeface="Helvetica"/>
-                  <a:sym typeface="Helvetica"/>
-                </a:defRPr>
-              </a:lvl1pPr>
-            </a:lstStyle>
-            <a:p>
-              <a:pPr/>
-              <a:r>
-                <a:t>Jenkins Plugins</a:t>
-              </a:r>
-            </a:p>
-          </p:txBody>
-        </p:sp>
-      </p:grpSp>
-      <p:sp>
-        <p:nvSpPr>
-          <p:cNvPr id="145" name="@bpmericle"/>
+        </p:nvSpPr>
+        <p:spPr>
+          <a:xfrm>
+            <a:off x="12789011" y="6273799"/>
+            <a:ext cx="633463" cy="1168401"/>
+          </a:xfrm>
+          <a:prstGeom prst="rect">
+            <a:avLst/>
+          </a:prstGeom>
+          <a:ln w="12700">
+            <a:miter lim="400000"/>
+          </a:ln>
+          <a:extLst>
+            <a:ext uri="{C572A759-6A51-4108-AA02-DFA0A04FC94B}">
+              <ma14:wrappingTextBoxFlag xmlns:ma14="http://schemas.microsoft.com/office/mac/drawingml/2011/main" val="1"/>
+            </a:ext>
+          </a:extLst>
+        </p:spPr>
+        <p:txBody>
+          <a:bodyPr wrap="none" lIns="50800" tIns="50800" rIns="50800" bIns="50800" anchor="ctr">
+            <a:spAutoFit/>
+          </a:bodyPr>
+          <a:lstStyle>
+            <a:lvl1pPr>
+              <a:defRPr b="1" sz="7000">
+                <a:latin typeface="Helvetica"/>
+                <a:ea typeface="Helvetica"/>
+                <a:cs typeface="Helvetica"/>
+                <a:sym typeface="Helvetica"/>
+              </a:defRPr>
+            </a:lvl1pPr>
+          </a:lstStyle>
+          <a:p>
+            <a:pPr/>
+            <a:r>
+              <a:t>+</a:t>
+            </a:r>
+          </a:p>
+        </p:txBody>
+      </p:sp>
+      <p:sp>
+        <p:nvSpPr>
+          <p:cNvPr id="135" name="Jenkins Plugin"/>
+          <p:cNvSpPr txBox="1"/>
+          <p:nvPr/>
+        </p:nvSpPr>
+        <p:spPr>
+          <a:xfrm>
+            <a:off x="14314204" y="6273799"/>
+            <a:ext cx="5846789" cy="1168401"/>
+          </a:xfrm>
+          <a:prstGeom prst="rect">
+            <a:avLst/>
+          </a:prstGeom>
+          <a:ln w="12700">
+            <a:miter lim="400000"/>
+          </a:ln>
+          <a:extLst>
+            <a:ext uri="{C572A759-6A51-4108-AA02-DFA0A04FC94B}">
+              <ma14:wrappingTextBoxFlag xmlns:ma14="http://schemas.microsoft.com/office/mac/drawingml/2011/main" val="1"/>
+            </a:ext>
+          </a:extLst>
+        </p:spPr>
+        <p:txBody>
+          <a:bodyPr wrap="none" lIns="50800" tIns="50800" rIns="50800" bIns="50800" anchor="ctr">
+            <a:spAutoFit/>
+          </a:bodyPr>
+          <a:lstStyle>
+            <a:lvl1pPr>
+              <a:defRPr sz="7000">
+                <a:latin typeface="Helvetica"/>
+                <a:ea typeface="Helvetica"/>
+                <a:cs typeface="Helvetica"/>
+                <a:sym typeface="Helvetica"/>
+              </a:defRPr>
+            </a:lvl1pPr>
+          </a:lstStyle>
+          <a:p>
+            <a:pPr/>
+            <a:r>
+              <a:t>Jenkins Plugin</a:t>
+            </a:r>
+          </a:p>
+        </p:txBody>
+      </p:sp>
+      <p:sp>
+        <p:nvSpPr>
+          <p:cNvPr id="136" name="@bpmericle"/>
           <p:cNvSpPr txBox="1"/>
           <p:nvPr/>
         </p:nvSpPr>
@@ -6580,7 +6245,7 @@
       </p:sp>
       <p:pic>
         <p:nvPicPr>
-          <p:cNvPr id="146" name="Logo2018_72DPI.png" descr="Logo2018_72DPI.png"/>
+          <p:cNvPr id="137" name="Logo2018_72DPI.png" descr="Logo2018_72DPI.png"/>
           <p:cNvPicPr>
             <a:picLocks noChangeAspect="1"/>
           </p:cNvPicPr>
@@ -6635,7 +6300,7 @@
       </p:grpSpPr>
       <p:sp>
         <p:nvSpPr>
-          <p:cNvPr id="148" name="Domain-Specific Language (DSL)"/>
+          <p:cNvPr id="139" name="Domain-Specific Language (DSL)"/>
           <p:cNvSpPr txBox="1"/>
           <p:nvPr>
             <p:ph type="title"/>
@@ -6667,7 +6332,7 @@
       </p:sp>
       <p:sp>
         <p:nvSpPr>
-          <p:cNvPr id="149" name="Groovy-based domain-specific language…"/>
+          <p:cNvPr id="140" name="Groovy-based domain-specific language…"/>
           <p:cNvSpPr txBox="1"/>
           <p:nvPr/>
         </p:nvSpPr>
@@ -6751,7 +6416,7 @@
       </p:sp>
       <p:sp>
         <p:nvSpPr>
-          <p:cNvPr id="150" name="@bpmericle"/>
+          <p:cNvPr id="141" name="@bpmericle"/>
           <p:cNvSpPr txBox="1"/>
           <p:nvPr/>
         </p:nvSpPr>
@@ -6791,7 +6456,7 @@
       </p:sp>
       <p:pic>
         <p:nvPicPr>
-          <p:cNvPr id="151" name="Logo2018_72DPI.png" descr="Logo2018_72DPI.png"/>
+          <p:cNvPr id="142" name="Logo2018_72DPI.png" descr="Logo2018_72DPI.png"/>
           <p:cNvPicPr>
             <a:picLocks noChangeAspect="1"/>
           </p:cNvPicPr>
@@ -6846,7 +6511,7 @@
       </p:grpSpPr>
       <p:sp>
         <p:nvSpPr>
-          <p:cNvPr id="153" name="Jenkins JobDSL Plugin"/>
+          <p:cNvPr id="144" name="Jenkins JobDSL Plugin"/>
           <p:cNvSpPr txBox="1"/>
           <p:nvPr>
             <p:ph type="title"/>
@@ -6874,14 +6539,14 @@
       </p:sp>
       <p:sp>
         <p:nvSpPr>
-          <p:cNvPr id="154" name="Allows DSL scripts to be executed within a job…"/>
+          <p:cNvPr id="145" name="Allows DSL scripts to be executed within a job…"/>
           <p:cNvSpPr txBox="1"/>
           <p:nvPr/>
         </p:nvSpPr>
         <p:spPr>
           <a:xfrm>
             <a:off x="3030280" y="5784447"/>
-            <a:ext cx="18323440" cy="3759201"/>
+            <a:ext cx="18323441" cy="3759201"/>
           </a:xfrm>
           <a:prstGeom prst="rect">
             <a:avLst/>
@@ -6958,7 +6623,7 @@
       </p:sp>
       <p:sp>
         <p:nvSpPr>
-          <p:cNvPr id="155" name="@bpmericle"/>
+          <p:cNvPr id="146" name="@bpmericle"/>
           <p:cNvSpPr txBox="1"/>
           <p:nvPr/>
         </p:nvSpPr>
@@ -6998,7 +6663,7 @@
       </p:sp>
       <p:pic>
         <p:nvPicPr>
-          <p:cNvPr id="156" name="Logo2018_72DPI.png" descr="Logo2018_72DPI.png"/>
+          <p:cNvPr id="147" name="Logo2018_72DPI.png" descr="Logo2018_72DPI.png"/>
           <p:cNvPicPr>
             <a:picLocks noChangeAspect="1"/>
           </p:cNvPicPr>
@@ -7053,7 +6718,7 @@
       </p:grpSpPr>
       <p:sp>
         <p:nvSpPr>
-          <p:cNvPr id="158" name="Jenkins Pipeline Plugins"/>
+          <p:cNvPr id="149" name="Jenkins Pipeline Plugins"/>
           <p:cNvSpPr txBox="1"/>
           <p:nvPr>
             <p:ph type="title"/>
@@ -7081,13 +6746,13 @@
       </p:sp>
       <p:sp>
         <p:nvSpPr>
-          <p:cNvPr id="159" name="A suite of plugins that lets you orchestrate simple to complex automation processes…"/>
+          <p:cNvPr id="150" name="A suite of plugins that lets you orchestrate simple to complex automation processes…"/>
           <p:cNvSpPr txBox="1"/>
           <p:nvPr/>
         </p:nvSpPr>
         <p:spPr>
           <a:xfrm>
-            <a:off x="1610075" y="4057248"/>
+            <a:off x="1610075" y="4057247"/>
             <a:ext cx="21163849" cy="7874001"/>
           </a:xfrm>
           <a:prstGeom prst="rect">
@@ -7177,7 +6842,7 @@
       </p:sp>
       <p:sp>
         <p:nvSpPr>
-          <p:cNvPr id="160" name="@bpmericle"/>
+          <p:cNvPr id="151" name="@bpmericle"/>
           <p:cNvSpPr txBox="1"/>
           <p:nvPr/>
         </p:nvSpPr>
@@ -7217,7 +6882,7 @@
       </p:sp>
       <p:pic>
         <p:nvPicPr>
-          <p:cNvPr id="161" name="Logo2018_72DPI.png" descr="Logo2018_72DPI.png"/>
+          <p:cNvPr id="152" name="Logo2018_72DPI.png" descr="Logo2018_72DPI.png"/>
           <p:cNvPicPr>
             <a:picLocks noChangeAspect="1"/>
           </p:cNvPicPr>
@@ -7272,7 +6937,7 @@
       </p:grpSpPr>
       <p:pic>
         <p:nvPicPr>
-          <p:cNvPr id="163" name="job-dsl-example.png" descr="job-dsl-example.png"/>
+          <p:cNvPr id="154" name="job-dsl-example.png" descr="job-dsl-example.png"/>
           <p:cNvPicPr>
             <a:picLocks noChangeAspect="1"/>
           </p:cNvPicPr>
@@ -7301,7 +6966,7 @@
       </p:pic>
       <p:sp>
         <p:nvSpPr>
-          <p:cNvPr id="164" name="Jenkins Freestyle Job Definition"/>
+          <p:cNvPr id="155" name="Jenkins Freestyle Job Definition"/>
           <p:cNvSpPr txBox="1"/>
           <p:nvPr/>
         </p:nvSpPr>
@@ -7341,7 +7006,7 @@
       </p:sp>
       <p:pic>
         <p:nvPicPr>
-          <p:cNvPr id="165" name="Logo2018_72DPI.png" descr="Logo2018_72DPI.png"/>
+          <p:cNvPr id="156" name="Logo2018_72DPI.png" descr="Logo2018_72DPI.png"/>
           <p:cNvPicPr>
             <a:picLocks noChangeAspect="1"/>
           </p:cNvPicPr>
@@ -7396,7 +7061,7 @@
       </p:grpSpPr>
       <p:pic>
         <p:nvPicPr>
-          <p:cNvPr id="167" name="pipeline-as-code.png" descr="pipeline-as-code.png"/>
+          <p:cNvPr id="158" name="pipeline-as-code.png" descr="pipeline-as-code.png"/>
           <p:cNvPicPr>
             <a:picLocks noChangeAspect="1"/>
           </p:cNvPicPr>
@@ -7425,7 +7090,7 @@
       </p:pic>
       <p:sp>
         <p:nvSpPr>
-          <p:cNvPr id="168" name="Jenkins Pipeline Job Definition"/>
+          <p:cNvPr id="159" name="Jenkins Pipeline Job Definition"/>
           <p:cNvSpPr txBox="1"/>
           <p:nvPr/>
         </p:nvSpPr>
@@ -7465,7 +7130,7 @@
       </p:sp>
       <p:pic>
         <p:nvPicPr>
-          <p:cNvPr id="169" name="Logo2018_72DPI.png" descr="Logo2018_72DPI.png"/>
+          <p:cNvPr id="160" name="Logo2018_72DPI.png" descr="Logo2018_72DPI.png"/>
           <p:cNvPicPr>
             <a:picLocks noChangeAspect="1"/>
           </p:cNvPicPr>
@@ -7518,9 +7183,49 @@
           <a:chExt cx="0" cy="0"/>
         </a:xfrm>
       </p:grpSpPr>
+      <p:sp>
+        <p:nvSpPr>
+          <p:cNvPr id="162" name="Jenkins Pipeline Definition"/>
+          <p:cNvSpPr txBox="1"/>
+          <p:nvPr/>
+        </p:nvSpPr>
+        <p:spPr>
+          <a:xfrm>
+            <a:off x="4131564" y="-267871"/>
+            <a:ext cx="16120873" cy="1752601"/>
+          </a:xfrm>
+          <a:prstGeom prst="rect">
+            <a:avLst/>
+          </a:prstGeom>
+          <a:ln w="12700">
+            <a:miter lim="400000"/>
+          </a:ln>
+          <a:extLst>
+            <a:ext uri="{C572A759-6A51-4108-AA02-DFA0A04FC94B}">
+              <ma14:wrappingTextBoxFlag xmlns:ma14="http://schemas.microsoft.com/office/mac/drawingml/2011/main" val="1"/>
+            </a:ext>
+          </a:extLst>
+        </p:spPr>
+        <p:txBody>
+          <a:bodyPr wrap="none" lIns="50800" tIns="50800" rIns="50800" bIns="50800" anchor="ctr">
+            <a:spAutoFit/>
+          </a:bodyPr>
+          <a:lstStyle>
+            <a:lvl1pPr>
+              <a:defRPr sz="10800"/>
+            </a:lvl1pPr>
+          </a:lstStyle>
+          <a:p>
+            <a:pPr/>
+            <a:r>
+              <a:t>Jenkins Pipeline Definition</a:t>
+            </a:r>
+          </a:p>
+        </p:txBody>
+      </p:sp>
       <p:pic>
         <p:nvPicPr>
-          <p:cNvPr id="171" name="jenkinsfile-sample.png" descr="jenkinsfile-sample.png"/>
+          <p:cNvPr id="163" name="Logo2018_72DPI.png" descr="Logo2018_72DPI.png"/>
           <p:cNvPicPr>
             <a:picLocks noChangeAspect="1"/>
           </p:cNvPicPr>
@@ -7536,8 +7241,8 @@
         </p:blipFill>
         <p:spPr>
           <a:xfrm>
-            <a:off x="4320102" y="1429423"/>
-            <a:ext cx="15743796" cy="12255216"/>
+            <a:off x="44268" y="12774774"/>
+            <a:ext cx="2004850" cy="889001"/>
           </a:xfrm>
           <a:prstGeom prst="rect">
             <a:avLst/>
@@ -7547,49 +7252,9 @@
           </a:ln>
         </p:spPr>
       </p:pic>
-      <p:sp>
-        <p:nvSpPr>
-          <p:cNvPr id="172" name="Jenkins Pipeline Definition"/>
-          <p:cNvSpPr txBox="1"/>
-          <p:nvPr/>
-        </p:nvSpPr>
-        <p:spPr>
-          <a:xfrm>
-            <a:off x="4131564" y="-267871"/>
-            <a:ext cx="16120873" cy="1752601"/>
-          </a:xfrm>
-          <a:prstGeom prst="rect">
-            <a:avLst/>
-          </a:prstGeom>
-          <a:ln w="12700">
-            <a:miter lim="400000"/>
-          </a:ln>
-          <a:extLst>
-            <a:ext uri="{C572A759-6A51-4108-AA02-DFA0A04FC94B}">
-              <ma14:wrappingTextBoxFlag xmlns:ma14="http://schemas.microsoft.com/office/mac/drawingml/2011/main" val="1"/>
-            </a:ext>
-          </a:extLst>
-        </p:spPr>
-        <p:txBody>
-          <a:bodyPr wrap="none" lIns="50800" tIns="50800" rIns="50800" bIns="50800" anchor="ctr">
-            <a:spAutoFit/>
-          </a:bodyPr>
-          <a:lstStyle>
-            <a:lvl1pPr>
-              <a:defRPr sz="10800"/>
-            </a:lvl1pPr>
-          </a:lstStyle>
-          <a:p>
-            <a:pPr/>
-            <a:r>
-              <a:t>Jenkins Pipeline Definition</a:t>
-            </a:r>
-          </a:p>
-        </p:txBody>
-      </p:sp>
       <p:pic>
         <p:nvPicPr>
-          <p:cNvPr id="173" name="Logo2018_72DPI.png" descr="Logo2018_72DPI.png"/>
+          <p:cNvPr id="164" name="jenkinsfile.png" descr="jenkinsfile.png"/>
           <p:cNvPicPr>
             <a:picLocks noChangeAspect="1"/>
           </p:cNvPicPr>
@@ -7605,8 +7270,8 @@
         </p:blipFill>
         <p:spPr>
           <a:xfrm>
-            <a:off x="44268" y="12774774"/>
-            <a:ext cx="2004850" cy="889001"/>
+            <a:off x="7662498" y="1330397"/>
+            <a:ext cx="9059004" cy="12313734"/>
           </a:xfrm>
           <a:prstGeom prst="rect">
             <a:avLst/>

</xml_diff>